<commit_message>
updates a few ppts
</commit_message>
<xml_diff>
--- a/1-csharp/REPO_MarksCodeAndPPTs/DotNetPPTs/D4_.NET_LINQ.pptx
+++ b/1-csharp/REPO_MarksCodeAndPPTs/DotNetPPTs/D4_.NET_LINQ.pptx
@@ -373,7 +373,7 @@
           <a:p>
             <a:fld id="{9184DA70-C731-4C70-880D-CCD4705E623C}" type="datetime1">
               <a:rPr lang="en-US" smtClean="0"/>
-              <a:t>3/5/2020</a:t>
+              <a:t>3/17/2020</a:t>
             </a:fld>
             <a:endParaRPr lang="en-US" dirty="0"/>
           </a:p>
@@ -561,7 +561,7 @@
           <a:p>
             <a:fld id="{B612A279-0833-481D-8C56-F67FD0AC6C50}" type="datetime1">
               <a:rPr lang="en-US" smtClean="0"/>
-              <a:t>3/5/2020</a:t>
+              <a:t>3/17/2020</a:t>
             </a:fld>
             <a:endParaRPr lang="en-US" dirty="0"/>
           </a:p>
@@ -803,7 +803,7 @@
           <a:p>
             <a:fld id="{6587DA83-5663-4C9C-B9AA-0B40A3DAFF81}" type="datetime1">
               <a:rPr lang="en-US" smtClean="0"/>
-              <a:t>3/5/2020</a:t>
+              <a:t>3/17/2020</a:t>
             </a:fld>
             <a:endParaRPr lang="en-US" dirty="0"/>
           </a:p>
@@ -991,7 +991,7 @@
           <a:p>
             <a:fld id="{4BE1D723-8F53-4F53-90B0-1982A396982E}" type="datetime1">
               <a:rPr lang="en-US" smtClean="0"/>
-              <a:t>3/5/2020</a:t>
+              <a:t>3/17/2020</a:t>
             </a:fld>
             <a:endParaRPr lang="en-US" dirty="0"/>
           </a:p>
@@ -1364,7 +1364,7 @@
           <a:p>
             <a:fld id="{97669AF7-7BEB-44E4-9852-375E34362B5B}" type="datetime1">
               <a:rPr lang="en-US" smtClean="0"/>
-              <a:t>3/5/2020</a:t>
+              <a:t>3/17/2020</a:t>
             </a:fld>
             <a:endParaRPr lang="en-US" dirty="0"/>
           </a:p>
@@ -1619,7 +1619,7 @@
           <a:p>
             <a:fld id="{BAAAC38D-0552-4C82-B593-E6124DFADBE2}" type="datetime1">
               <a:rPr lang="en-US" smtClean="0"/>
-              <a:t>3/5/2020</a:t>
+              <a:t>3/17/2020</a:t>
             </a:fld>
             <a:endParaRPr lang="en-US" dirty="0"/>
           </a:p>
@@ -2016,7 +2016,7 @@
           <a:p>
             <a:fld id="{D9DF0F1C-5577-4ACB-BB62-DF8F3C494C7E}" type="datetime1">
               <a:rPr lang="en-US" smtClean="0"/>
-              <a:t>3/5/2020</a:t>
+              <a:t>3/17/2020</a:t>
             </a:fld>
             <a:endParaRPr lang="en-US" dirty="0"/>
           </a:p>
@@ -2152,7 +2152,7 @@
           <a:p>
             <a:fld id="{1775B394-D9F9-4F0C-B15D-605F45CB9E9F}" type="datetime1">
               <a:rPr lang="en-US" smtClean="0"/>
-              <a:t>3/5/2020</a:t>
+              <a:t>3/17/2020</a:t>
             </a:fld>
             <a:endParaRPr lang="en-US" dirty="0"/>
           </a:p>
@@ -2309,7 +2309,7 @@
           <a:p>
             <a:fld id="{39667345-2558-425A-8533-9BFDBCE15005}" type="datetime1">
               <a:rPr lang="en-US" smtClean="0"/>
-              <a:t>3/5/2020</a:t>
+              <a:t>3/17/2020</a:t>
             </a:fld>
             <a:endParaRPr lang="en-US" dirty="0"/>
           </a:p>
@@ -2638,7 +2638,7 @@
           <a:p>
             <a:fld id="{92BEA474-078D-4E9B-9B14-09A87B19DC46}" type="datetime1">
               <a:rPr lang="en-US" smtClean="0"/>
-              <a:t>3/5/2020</a:t>
+              <a:t>3/17/2020</a:t>
             </a:fld>
             <a:endParaRPr lang="en-US" dirty="0"/>
           </a:p>
@@ -2988,7 +2988,7 @@
           <a:p>
             <a:fld id="{4907D986-8816-4272-A432-0437A28A9828}" type="datetime1">
               <a:rPr lang="en-US" smtClean="0"/>
-              <a:t>3/5/2020</a:t>
+              <a:t>3/17/2020</a:t>
             </a:fld>
             <a:endParaRPr lang="en-US" dirty="0"/>
           </a:p>
@@ -3249,7 +3249,7 @@
           <a:p>
             <a:fld id="{62D6E202-B606-4609-B914-27C9371A1F6D}" type="datetime1">
               <a:rPr lang="en-US" smtClean="0"/>
-              <a:t>3/5/2020</a:t>
+              <a:t>3/17/2020</a:t>
             </a:fld>
             <a:endParaRPr lang="en-US" dirty="0"/>
           </a:p>
@@ -3922,17 +3922,14 @@
               </a:rPr>
               <a:t>.net</a:t>
             </a:r>
-            <a:r>
-              <a:rPr lang="en-US" dirty="0">
-                <a:solidFill>
-                  <a:schemeClr val="tx1">
-                    <a:lumMod val="85000"/>
-                    <a:lumOff val="15000"/>
-                  </a:schemeClr>
-                </a:solidFill>
-              </a:rPr>
-              <a:t> / Microsoft dynamics 365</a:t>
-            </a:r>
+            <a:endParaRPr lang="en-US" dirty="0">
+              <a:solidFill>
+                <a:schemeClr val="tx1">
+                  <a:lumMod val="85000"/>
+                  <a:lumOff val="15000"/>
+                </a:schemeClr>
+              </a:solidFill>
+            </a:endParaRPr>
           </a:p>
         </p:txBody>
       </p:sp>
@@ -4356,13 +4353,16 @@
           <a:lstStyle/>
           <a:p>
             <a:r>
-              <a:rPr lang="en-US">
-                <a:solidFill>
-                  <a:srgbClr val="FFFFFF"/>
-                </a:solidFill>
+              <a:rPr lang="en-US" dirty="0">
+                <a:hlinkClick r:id="rId2"/>
               </a:rPr>
-              <a:t>- Neil Armstrong</a:t>
-            </a:r>
+              <a:t>https://docs.microsoft.com/en-us/dotnet/csharp/linq/</a:t>
+            </a:r>
+            <a:endParaRPr lang="en-US" dirty="0">
+              <a:solidFill>
+                <a:srgbClr val="FFFFFF"/>
+              </a:solidFill>
+            </a:endParaRPr>
           </a:p>
         </p:txBody>
       </p:sp>
@@ -4431,6 +4431,15 @@
                 <a:hlinkClick r:id="rId2"/>
               </a:rPr>
               <a:t>https://docs.microsoft.com/en-us/dotnet/csharp/linq/</a:t>
+            </a:r>
+            <a:br>
+              <a:rPr lang="en-US" sz="1400" dirty="0"/>
+            </a:br>
+            <a:r>
+              <a:rPr lang="en-US" sz="1400" dirty="0">
+                <a:hlinkClick r:id="rId3"/>
+              </a:rPr>
+              <a:t>https://docs.microsoft.com/en-us/dotnet/csharp/programming-guide/concepts/linq/</a:t>
             </a:r>
             <a:endParaRPr lang="en-US" dirty="0"/>
           </a:p>
@@ -4794,7 +4803,7 @@
           <a:p>
             <a:r>
               <a:rPr lang="en-US" dirty="0"/>
-              <a:t>Generally, the source data is organized logically as a sequence of elements of the same kind.</a:t>
+              <a:t>Generally, the source data is organized logically as a sequence of elements of the same kind. For example:</a:t>
             </a:r>
           </a:p>
           <a:p>
@@ -4824,7 +4833,7 @@
             </a:pPr>
             <a:r>
               <a:rPr lang="en-US" dirty="0"/>
-              <a:t>An in-memory collection contains a sequence of objects.</a:t>
+              <a:t>An ‘in-memory’ collection contains a sequence of objects.</a:t>
             </a:r>
           </a:p>
           <a:p>

</xml_diff>